<commit_message>
updated qr codes and added autocomplete
</commit_message>
<xml_diff>
--- a/core/static/assets/img/gtreklogo.pptx
+++ b/core/static/assets/img/gtreklogo.pptx
@@ -5,8 +5,8 @@
     <p:sldMasterId id="2147483672" r:id="rId1"/>
   </p:sldMasterIdLst>
   <p:sldIdLst>
-    <p:sldId id="257" r:id="rId2"/>
-    <p:sldId id="258" r:id="rId3"/>
+    <p:sldId id="258" r:id="rId2"/>
+    <p:sldId id="260" r:id="rId3"/>
   </p:sldIdLst>
   <p:sldSz cx="3600450" cy="1079500"/>
   <p:notesSz cx="6858000" cy="9144000"/>
@@ -255,7 +255,7 @@
           <a:p>
             <a:fld id="{F810E1C8-151A-41B5-9C68-520A04EE1AF2}" type="datetimeFigureOut">
               <a:rPr lang="en-GB" smtClean="0"/>
-              <a:t>26/11/2020</a:t>
+              <a:t>14/01/2021</a:t>
             </a:fld>
             <a:endParaRPr lang="en-GB"/>
           </a:p>
@@ -425,7 +425,7 @@
           <a:p>
             <a:fld id="{F810E1C8-151A-41B5-9C68-520A04EE1AF2}" type="datetimeFigureOut">
               <a:rPr lang="en-GB" smtClean="0"/>
-              <a:t>26/11/2020</a:t>
+              <a:t>14/01/2021</a:t>
             </a:fld>
             <a:endParaRPr lang="en-GB"/>
           </a:p>
@@ -605,7 +605,7 @@
           <a:p>
             <a:fld id="{F810E1C8-151A-41B5-9C68-520A04EE1AF2}" type="datetimeFigureOut">
               <a:rPr lang="en-GB" smtClean="0"/>
-              <a:t>26/11/2020</a:t>
+              <a:t>14/01/2021</a:t>
             </a:fld>
             <a:endParaRPr lang="en-GB"/>
           </a:p>
@@ -775,7 +775,7 @@
           <a:p>
             <a:fld id="{F810E1C8-151A-41B5-9C68-520A04EE1AF2}" type="datetimeFigureOut">
               <a:rPr lang="en-GB" smtClean="0"/>
-              <a:t>26/11/2020</a:t>
+              <a:t>14/01/2021</a:t>
             </a:fld>
             <a:endParaRPr lang="en-GB"/>
           </a:p>
@@ -1021,7 +1021,7 @@
           <a:p>
             <a:fld id="{F810E1C8-151A-41B5-9C68-520A04EE1AF2}" type="datetimeFigureOut">
               <a:rPr lang="en-GB" smtClean="0"/>
-              <a:t>26/11/2020</a:t>
+              <a:t>14/01/2021</a:t>
             </a:fld>
             <a:endParaRPr lang="en-GB"/>
           </a:p>
@@ -1253,7 +1253,7 @@
           <a:p>
             <a:fld id="{F810E1C8-151A-41B5-9C68-520A04EE1AF2}" type="datetimeFigureOut">
               <a:rPr lang="en-GB" smtClean="0"/>
-              <a:t>26/11/2020</a:t>
+              <a:t>14/01/2021</a:t>
             </a:fld>
             <a:endParaRPr lang="en-GB"/>
           </a:p>
@@ -1620,7 +1620,7 @@
           <a:p>
             <a:fld id="{F810E1C8-151A-41B5-9C68-520A04EE1AF2}" type="datetimeFigureOut">
               <a:rPr lang="en-GB" smtClean="0"/>
-              <a:t>26/11/2020</a:t>
+              <a:t>14/01/2021</a:t>
             </a:fld>
             <a:endParaRPr lang="en-GB"/>
           </a:p>
@@ -1738,7 +1738,7 @@
           <a:p>
             <a:fld id="{F810E1C8-151A-41B5-9C68-520A04EE1AF2}" type="datetimeFigureOut">
               <a:rPr lang="en-GB" smtClean="0"/>
-              <a:t>26/11/2020</a:t>
+              <a:t>14/01/2021</a:t>
             </a:fld>
             <a:endParaRPr lang="en-GB"/>
           </a:p>
@@ -1833,7 +1833,7 @@
           <a:p>
             <a:fld id="{F810E1C8-151A-41B5-9C68-520A04EE1AF2}" type="datetimeFigureOut">
               <a:rPr lang="en-GB" smtClean="0"/>
-              <a:t>26/11/2020</a:t>
+              <a:t>14/01/2021</a:t>
             </a:fld>
             <a:endParaRPr lang="en-GB"/>
           </a:p>
@@ -2110,7 +2110,7 @@
           <a:p>
             <a:fld id="{F810E1C8-151A-41B5-9C68-520A04EE1AF2}" type="datetimeFigureOut">
               <a:rPr lang="en-GB" smtClean="0"/>
-              <a:t>26/11/2020</a:t>
+              <a:t>14/01/2021</a:t>
             </a:fld>
             <a:endParaRPr lang="en-GB"/>
           </a:p>
@@ -2367,7 +2367,7 @@
           <a:p>
             <a:fld id="{F810E1C8-151A-41B5-9C68-520A04EE1AF2}" type="datetimeFigureOut">
               <a:rPr lang="en-GB" smtClean="0"/>
-              <a:t>26/11/2020</a:t>
+              <a:t>14/01/2021</a:t>
             </a:fld>
             <a:endParaRPr lang="en-GB"/>
           </a:p>
@@ -2580,7 +2580,7 @@
           <a:p>
             <a:fld id="{F810E1C8-151A-41B5-9C68-520A04EE1AF2}" type="datetimeFigureOut">
               <a:rPr lang="en-GB" smtClean="0"/>
-              <a:t>26/11/2020</a:t>
+              <a:t>14/01/2021</a:t>
             </a:fld>
             <a:endParaRPr lang="en-GB"/>
           </a:p>
@@ -2974,323 +2974,6 @@
     <p:bg>
       <p:bgPr>
         <a:solidFill>
-          <a:srgbClr val="3055BB">
-            <a:alpha val="0"/>
-          </a:srgbClr>
-        </a:solidFill>
-        <a:effectLst/>
-      </p:bgPr>
-    </p:bg>
-    <p:spTree>
-      <p:nvGrpSpPr>
-        <p:cNvPr id="1" name=""/>
-        <p:cNvGrpSpPr/>
-        <p:nvPr/>
-      </p:nvGrpSpPr>
-      <p:grpSpPr>
-        <a:xfrm>
-          <a:off x="0" y="0"/>
-          <a:ext cx="0" cy="0"/>
-          <a:chOff x="0" y="0"/>
-          <a:chExt cx="0" cy="0"/>
-        </a:xfrm>
-      </p:grpSpPr>
-      <p:grpSp>
-        <p:nvGrpSpPr>
-          <p:cNvPr id="21" name="Group 20">
-            <a:extLst>
-              <a:ext uri="{FF2B5EF4-FFF2-40B4-BE49-F238E27FC236}">
-                <a16:creationId xmlns:a16="http://schemas.microsoft.com/office/drawing/2014/main" id="{686DA9C1-FF70-499B-AB54-180FCAB408AC}"/>
-              </a:ext>
-            </a:extLst>
-          </p:cNvPr>
-          <p:cNvGrpSpPr/>
-          <p:nvPr/>
-        </p:nvGrpSpPr>
-        <p:grpSpPr>
-          <a:xfrm>
-            <a:off x="627554" y="69648"/>
-            <a:ext cx="2345342" cy="847872"/>
-            <a:chOff x="374166" y="300480"/>
-            <a:chExt cx="1172671" cy="423936"/>
-          </a:xfrm>
-        </p:grpSpPr>
-        <p:sp>
-          <p:nvSpPr>
-            <p:cNvPr id="4" name="TextBox 3">
-              <a:extLst>
-                <a:ext uri="{FF2B5EF4-FFF2-40B4-BE49-F238E27FC236}">
-                  <a16:creationId xmlns:a16="http://schemas.microsoft.com/office/drawing/2014/main" id="{94D97430-4F9F-41FF-926C-F638104AC83B}"/>
-                </a:ext>
-              </a:extLst>
-            </p:cNvPr>
-            <p:cNvSpPr txBox="1"/>
-            <p:nvPr/>
-          </p:nvSpPr>
-          <p:spPr>
-            <a:xfrm>
-              <a:off x="374166" y="308917"/>
-              <a:ext cx="959558" cy="415499"/>
-            </a:xfrm>
-            <a:prstGeom prst="rect">
-              <a:avLst/>
-            </a:prstGeom>
-            <a:noFill/>
-            <a:effectLst/>
-          </p:spPr>
-          <p:txBody>
-            <a:bodyPr wrap="none" rtlCol="0">
-              <a:spAutoFit/>
-            </a:bodyPr>
-            <a:lstStyle/>
-            <a:p>
-              <a:r>
-                <a:rPr lang="en-GB" sz="4800" dirty="0">
-                  <a:solidFill>
-                    <a:srgbClr val="3055BB"/>
-                  </a:solidFill>
-                  <a:latin typeface="Poppins" panose="00000500000000000000" pitchFamily="2" charset="0"/>
-                  <a:cs typeface="Poppins" panose="00000500000000000000" pitchFamily="2" charset="0"/>
-                </a:rPr>
-                <a:t>g trek</a:t>
-              </a:r>
-            </a:p>
-          </p:txBody>
-        </p:sp>
-        <p:sp>
-          <p:nvSpPr>
-            <p:cNvPr id="15" name="Rectangle 14">
-              <a:extLst>
-                <a:ext uri="{FF2B5EF4-FFF2-40B4-BE49-F238E27FC236}">
-                  <a16:creationId xmlns:a16="http://schemas.microsoft.com/office/drawing/2014/main" id="{BD8A806F-3936-4C1F-8134-139DF2C1668C}"/>
-                </a:ext>
-              </a:extLst>
-            </p:cNvPr>
-            <p:cNvSpPr/>
-            <p:nvPr/>
-          </p:nvSpPr>
-          <p:spPr>
-            <a:xfrm>
-              <a:off x="1012031" y="300480"/>
-              <a:ext cx="111040" cy="111120"/>
-            </a:xfrm>
-            <a:prstGeom prst="rect">
-              <a:avLst/>
-            </a:prstGeom>
-            <a:noFill/>
-            <a:ln>
-              <a:solidFill>
-                <a:srgbClr val="3055BB"/>
-              </a:solidFill>
-            </a:ln>
-            <a:effectLst/>
-          </p:spPr>
-          <p:style>
-            <a:lnRef idx="2">
-              <a:schemeClr val="accent1">
-                <a:shade val="50000"/>
-              </a:schemeClr>
-            </a:lnRef>
-            <a:fillRef idx="1">
-              <a:schemeClr val="accent1"/>
-            </a:fillRef>
-            <a:effectRef idx="0">
-              <a:schemeClr val="accent1"/>
-            </a:effectRef>
-            <a:fontRef idx="minor">
-              <a:schemeClr val="lt1"/>
-            </a:fontRef>
-          </p:style>
-          <p:txBody>
-            <a:bodyPr rtlCol="0" anchor="ctr"/>
-            <a:lstStyle/>
-            <a:p>
-              <a:pPr algn="ctr"/>
-              <a:endParaRPr lang="en-GB" sz="3600"/>
-            </a:p>
-          </p:txBody>
-        </p:sp>
-        <p:sp>
-          <p:nvSpPr>
-            <p:cNvPr id="17" name="Google Shape;4956;p65">
-              <a:extLst>
-                <a:ext uri="{FF2B5EF4-FFF2-40B4-BE49-F238E27FC236}">
-                  <a16:creationId xmlns:a16="http://schemas.microsoft.com/office/drawing/2014/main" id="{057B9EA0-9544-40CB-8433-2D007290CE36}"/>
-                </a:ext>
-              </a:extLst>
-            </p:cNvPr>
-            <p:cNvSpPr/>
-            <p:nvPr/>
-          </p:nvSpPr>
-          <p:spPr>
-            <a:xfrm>
-              <a:off x="662331" y="490736"/>
-              <a:ext cx="116556" cy="119062"/>
-            </a:xfrm>
-            <a:custGeom>
-              <a:avLst/>
-              <a:gdLst/>
-              <a:ahLst/>
-              <a:cxnLst/>
-              <a:rect l="l" t="t" r="r" b="b"/>
-              <a:pathLst>
-                <a:path w="1148" h="1662" extrusionOk="0">
-                  <a:moveTo>
-                    <a:pt x="52" y="1"/>
-                  </a:moveTo>
-                  <a:cubicBezTo>
-                    <a:pt x="27" y="1"/>
-                    <a:pt x="0" y="24"/>
-                    <a:pt x="0" y="56"/>
-                  </a:cubicBezTo>
-                  <a:lnTo>
-                    <a:pt x="0" y="200"/>
-                  </a:lnTo>
-                  <a:cubicBezTo>
-                    <a:pt x="0" y="243"/>
-                    <a:pt x="22" y="279"/>
-                    <a:pt x="51" y="308"/>
-                  </a:cubicBezTo>
-                  <a:lnTo>
-                    <a:pt x="700" y="791"/>
-                  </a:lnTo>
-                  <a:cubicBezTo>
-                    <a:pt x="729" y="813"/>
-                    <a:pt x="729" y="849"/>
-                    <a:pt x="700" y="871"/>
-                  </a:cubicBezTo>
-                  <a:lnTo>
-                    <a:pt x="51" y="1354"/>
-                  </a:lnTo>
-                  <a:cubicBezTo>
-                    <a:pt x="22" y="1383"/>
-                    <a:pt x="0" y="1419"/>
-                    <a:pt x="0" y="1462"/>
-                  </a:cubicBezTo>
-                  <a:lnTo>
-                    <a:pt x="0" y="1613"/>
-                  </a:lnTo>
-                  <a:cubicBezTo>
-                    <a:pt x="0" y="1639"/>
-                    <a:pt x="26" y="1661"/>
-                    <a:pt x="51" y="1661"/>
-                  </a:cubicBezTo>
-                  <a:cubicBezTo>
-                    <a:pt x="61" y="1661"/>
-                    <a:pt x="71" y="1658"/>
-                    <a:pt x="80" y="1649"/>
-                  </a:cubicBezTo>
-                  <a:lnTo>
-                    <a:pt x="1111" y="878"/>
-                  </a:lnTo>
-                  <a:cubicBezTo>
-                    <a:pt x="1147" y="856"/>
-                    <a:pt x="1147" y="806"/>
-                    <a:pt x="1111" y="784"/>
-                  </a:cubicBezTo>
-                  <a:lnTo>
-                    <a:pt x="80" y="12"/>
-                  </a:lnTo>
-                  <a:cubicBezTo>
-                    <a:pt x="72" y="4"/>
-                    <a:pt x="62" y="1"/>
-                    <a:pt x="52" y="1"/>
-                  </a:cubicBezTo>
-                  <a:close/>
-                </a:path>
-              </a:pathLst>
-            </a:custGeom>
-            <a:solidFill>
-              <a:srgbClr val="3055BB"/>
-            </a:solidFill>
-            <a:ln>
-              <a:noFill/>
-            </a:ln>
-          </p:spPr>
-          <p:txBody>
-            <a:bodyPr spcFirstLastPara="1" wrap="square" lIns="182850" tIns="182850" rIns="182850" bIns="182850" anchor="ctr" anchorCtr="0">
-              <a:noAutofit/>
-            </a:bodyPr>
-            <a:lstStyle/>
-            <a:p>
-              <a:endParaRPr sz="3600"/>
-            </a:p>
-          </p:txBody>
-        </p:sp>
-        <p:sp>
-          <p:nvSpPr>
-            <p:cNvPr id="19" name="Rectangle: Rounded Corners 18">
-              <a:extLst>
-                <a:ext uri="{FF2B5EF4-FFF2-40B4-BE49-F238E27FC236}">
-                  <a16:creationId xmlns:a16="http://schemas.microsoft.com/office/drawing/2014/main" id="{536EB5E9-8398-421D-B7B9-695C4FBF56F2}"/>
-                </a:ext>
-              </a:extLst>
-            </p:cNvPr>
-            <p:cNvSpPr>
-              <a:spLocks noChangeAspect="1"/>
-            </p:cNvSpPr>
-            <p:nvPr/>
-          </p:nvSpPr>
-          <p:spPr>
-            <a:xfrm>
-              <a:off x="1366837" y="460267"/>
-              <a:ext cx="180000" cy="180000"/>
-            </a:xfrm>
-            <a:prstGeom prst="roundRect">
-              <a:avLst/>
-            </a:prstGeom>
-            <a:solidFill>
-              <a:srgbClr val="3055BB"/>
-            </a:solidFill>
-            <a:ln>
-              <a:noFill/>
-            </a:ln>
-          </p:spPr>
-          <p:style>
-            <a:lnRef idx="2">
-              <a:schemeClr val="accent1">
-                <a:shade val="50000"/>
-              </a:schemeClr>
-            </a:lnRef>
-            <a:fillRef idx="1">
-              <a:schemeClr val="accent1"/>
-            </a:fillRef>
-            <a:effectRef idx="0">
-              <a:schemeClr val="accent1"/>
-            </a:effectRef>
-            <a:fontRef idx="minor">
-              <a:schemeClr val="lt1"/>
-            </a:fontRef>
-          </p:style>
-          <p:txBody>
-            <a:bodyPr rtlCol="0" anchor="ctr"/>
-            <a:lstStyle/>
-            <a:p>
-              <a:pPr algn="ctr"/>
-              <a:endParaRPr lang="en-GB" sz="3600"/>
-            </a:p>
-          </p:txBody>
-        </p:sp>
-      </p:grpSp>
-    </p:spTree>
-    <p:extLst>
-      <p:ext uri="{BB962C8B-B14F-4D97-AF65-F5344CB8AC3E}">
-        <p14:creationId xmlns:p14="http://schemas.microsoft.com/office/powerpoint/2010/main" val="1318393058"/>
-      </p:ext>
-    </p:extLst>
-  </p:cSld>
-  <p:clrMapOvr>
-    <a:masterClrMapping/>
-  </p:clrMapOvr>
-</p:sld>
-</file>
-
-<file path=ppt/slides/slide2.xml><?xml version="1.0" encoding="utf-8"?>
-<p:sld xmlns:a="http://schemas.openxmlformats.org/drawingml/2006/main" xmlns:r="http://schemas.openxmlformats.org/officeDocument/2006/relationships" xmlns:p="http://schemas.openxmlformats.org/presentationml/2006/main">
-  <p:cSld>
-    <p:bg>
-      <p:bgPr>
-        <a:solidFill>
           <a:srgbClr val="3055BB"/>
         </a:solidFill>
         <a:effectLst/>
@@ -3324,8 +3007,8 @@
         </p:nvSpPr>
         <p:spPr>
           <a:xfrm>
-            <a:off x="1137829" y="-106171"/>
-            <a:ext cx="1914307" cy="1200329"/>
+            <a:off x="1137829" y="20547"/>
+            <a:ext cx="2050561" cy="1200329"/>
           </a:xfrm>
           <a:prstGeom prst="rect">
             <a:avLst/>
@@ -3347,7 +3030,7 @@
                 <a:latin typeface="Poppins" panose="00000500000000000000" pitchFamily="2" charset="0"/>
                 <a:cs typeface="Poppins" panose="00000500000000000000" pitchFamily="2" charset="0"/>
               </a:rPr>
-              <a:t>trek</a:t>
+              <a:t>trac</a:t>
             </a:r>
           </a:p>
         </p:txBody>
@@ -3475,7 +3158,7 @@
         </p:nvSpPr>
         <p:spPr>
           <a:xfrm>
-            <a:off x="3108878" y="400891"/>
+            <a:off x="3149710" y="503796"/>
             <a:ext cx="277716" cy="277716"/>
           </a:xfrm>
           <a:prstGeom prst="roundRect">
@@ -3527,7 +3210,7 @@
         </p:nvSpPr>
         <p:spPr>
           <a:xfrm>
-            <a:off x="90558" y="-82973"/>
+            <a:off x="90558" y="43745"/>
             <a:ext cx="808235" cy="1200329"/>
           </a:xfrm>
           <a:prstGeom prst="rect">
@@ -3559,6 +3242,285 @@
     <p:extLst>
       <p:ext uri="{BB962C8B-B14F-4D97-AF65-F5344CB8AC3E}">
         <p14:creationId xmlns:p14="http://schemas.microsoft.com/office/powerpoint/2010/main" val="1851603163"/>
+      </p:ext>
+    </p:extLst>
+  </p:cSld>
+  <p:clrMapOvr>
+    <a:masterClrMapping/>
+  </p:clrMapOvr>
+</p:sld>
+</file>
+
+<file path=ppt/slides/slide2.xml><?xml version="1.0" encoding="utf-8"?>
+<p:sld xmlns:a="http://schemas.openxmlformats.org/drawingml/2006/main" xmlns:r="http://schemas.openxmlformats.org/officeDocument/2006/relationships" xmlns:p="http://schemas.openxmlformats.org/presentationml/2006/main">
+  <p:cSld>
+    <p:spTree>
+      <p:nvGrpSpPr>
+        <p:cNvPr id="1" name=""/>
+        <p:cNvGrpSpPr/>
+        <p:nvPr/>
+      </p:nvGrpSpPr>
+      <p:grpSpPr>
+        <a:xfrm>
+          <a:off x="0" y="0"/>
+          <a:ext cx="0" cy="0"/>
+          <a:chOff x="0" y="0"/>
+          <a:chExt cx="0" cy="0"/>
+        </a:xfrm>
+      </p:grpSpPr>
+      <p:sp>
+        <p:nvSpPr>
+          <p:cNvPr id="4" name="TextBox 3">
+            <a:extLst>
+              <a:ext uri="{FF2B5EF4-FFF2-40B4-BE49-F238E27FC236}">
+                <a16:creationId xmlns:a16="http://schemas.microsoft.com/office/drawing/2014/main" id="{94D97430-4F9F-41FF-926C-F638104AC83B}"/>
+              </a:ext>
+            </a:extLst>
+          </p:cNvPr>
+          <p:cNvSpPr txBox="1"/>
+          <p:nvPr/>
+        </p:nvSpPr>
+        <p:spPr>
+          <a:xfrm>
+            <a:off x="1137829" y="20547"/>
+            <a:ext cx="2050561" cy="1200329"/>
+          </a:xfrm>
+          <a:prstGeom prst="rect">
+            <a:avLst/>
+          </a:prstGeom>
+          <a:noFill/>
+          <a:effectLst/>
+        </p:spPr>
+        <p:txBody>
+          <a:bodyPr wrap="none" rtlCol="0">
+            <a:spAutoFit/>
+          </a:bodyPr>
+          <a:lstStyle/>
+          <a:p>
+            <a:r>
+              <a:rPr lang="en-GB" sz="7200" dirty="0">
+                <a:solidFill>
+                  <a:srgbClr val="3055BB"/>
+                </a:solidFill>
+                <a:latin typeface="Poppins" panose="00000500000000000000" pitchFamily="2" charset="0"/>
+                <a:cs typeface="Poppins" panose="00000500000000000000" pitchFamily="2" charset="0"/>
+              </a:rPr>
+              <a:t>trac</a:t>
+            </a:r>
+          </a:p>
+        </p:txBody>
+      </p:sp>
+      <p:sp>
+        <p:nvSpPr>
+          <p:cNvPr id="17" name="Google Shape;4956;p65">
+            <a:extLst>
+              <a:ext uri="{FF2B5EF4-FFF2-40B4-BE49-F238E27FC236}">
+                <a16:creationId xmlns:a16="http://schemas.microsoft.com/office/drawing/2014/main" id="{057B9EA0-9544-40CB-8433-2D007290CE36}"/>
+              </a:ext>
+            </a:extLst>
+          </p:cNvPr>
+          <p:cNvSpPr/>
+          <p:nvPr/>
+        </p:nvSpPr>
+        <p:spPr>
+          <a:xfrm>
+            <a:off x="889149" y="373092"/>
+            <a:ext cx="248680" cy="333314"/>
+          </a:xfrm>
+          <a:custGeom>
+            <a:avLst/>
+            <a:gdLst/>
+            <a:ahLst/>
+            <a:cxnLst/>
+            <a:rect l="l" t="t" r="r" b="b"/>
+            <a:pathLst>
+              <a:path w="1148" h="1662" extrusionOk="0">
+                <a:moveTo>
+                  <a:pt x="52" y="1"/>
+                </a:moveTo>
+                <a:cubicBezTo>
+                  <a:pt x="27" y="1"/>
+                  <a:pt x="0" y="24"/>
+                  <a:pt x="0" y="56"/>
+                </a:cubicBezTo>
+                <a:lnTo>
+                  <a:pt x="0" y="200"/>
+                </a:lnTo>
+                <a:cubicBezTo>
+                  <a:pt x="0" y="243"/>
+                  <a:pt x="22" y="279"/>
+                  <a:pt x="51" y="308"/>
+                </a:cubicBezTo>
+                <a:lnTo>
+                  <a:pt x="700" y="791"/>
+                </a:lnTo>
+                <a:cubicBezTo>
+                  <a:pt x="729" y="813"/>
+                  <a:pt x="729" y="849"/>
+                  <a:pt x="700" y="871"/>
+                </a:cubicBezTo>
+                <a:lnTo>
+                  <a:pt x="51" y="1354"/>
+                </a:lnTo>
+                <a:cubicBezTo>
+                  <a:pt x="22" y="1383"/>
+                  <a:pt x="0" y="1419"/>
+                  <a:pt x="0" y="1462"/>
+                </a:cubicBezTo>
+                <a:lnTo>
+                  <a:pt x="0" y="1613"/>
+                </a:lnTo>
+                <a:cubicBezTo>
+                  <a:pt x="0" y="1639"/>
+                  <a:pt x="26" y="1661"/>
+                  <a:pt x="51" y="1661"/>
+                </a:cubicBezTo>
+                <a:cubicBezTo>
+                  <a:pt x="61" y="1661"/>
+                  <a:pt x="71" y="1658"/>
+                  <a:pt x="80" y="1649"/>
+                </a:cubicBezTo>
+                <a:lnTo>
+                  <a:pt x="1111" y="878"/>
+                </a:lnTo>
+                <a:cubicBezTo>
+                  <a:pt x="1147" y="856"/>
+                  <a:pt x="1147" y="806"/>
+                  <a:pt x="1111" y="784"/>
+                </a:cubicBezTo>
+                <a:lnTo>
+                  <a:pt x="80" y="12"/>
+                </a:lnTo>
+                <a:cubicBezTo>
+                  <a:pt x="72" y="4"/>
+                  <a:pt x="62" y="1"/>
+                  <a:pt x="52" y="1"/>
+                </a:cubicBezTo>
+                <a:close/>
+              </a:path>
+            </a:pathLst>
+          </a:custGeom>
+          <a:solidFill>
+            <a:srgbClr val="3055BB"/>
+          </a:solidFill>
+          <a:ln>
+            <a:noFill/>
+          </a:ln>
+        </p:spPr>
+        <p:txBody>
+          <a:bodyPr spcFirstLastPara="1" wrap="square" lIns="182850" tIns="182850" rIns="182850" bIns="182850" anchor="ctr" anchorCtr="0">
+            <a:noAutofit/>
+          </a:bodyPr>
+          <a:lstStyle/>
+          <a:p>
+            <a:endParaRPr sz="3600">
+              <a:solidFill>
+                <a:srgbClr val="3055BB"/>
+              </a:solidFill>
+            </a:endParaRPr>
+          </a:p>
+        </p:txBody>
+      </p:sp>
+      <p:sp>
+        <p:nvSpPr>
+          <p:cNvPr id="19" name="Rectangle: Rounded Corners 18">
+            <a:extLst>
+              <a:ext uri="{FF2B5EF4-FFF2-40B4-BE49-F238E27FC236}">
+                <a16:creationId xmlns:a16="http://schemas.microsoft.com/office/drawing/2014/main" id="{536EB5E9-8398-421D-B7B9-695C4FBF56F2}"/>
+              </a:ext>
+            </a:extLst>
+          </p:cNvPr>
+          <p:cNvSpPr>
+            <a:spLocks noChangeAspect="1"/>
+          </p:cNvSpPr>
+          <p:nvPr/>
+        </p:nvSpPr>
+        <p:spPr>
+          <a:xfrm>
+            <a:off x="3149710" y="503796"/>
+            <a:ext cx="277716" cy="277716"/>
+          </a:xfrm>
+          <a:prstGeom prst="roundRect">
+            <a:avLst/>
+          </a:prstGeom>
+          <a:solidFill>
+            <a:srgbClr val="3055BB"/>
+          </a:solidFill>
+          <a:ln>
+            <a:noFill/>
+          </a:ln>
+        </p:spPr>
+        <p:style>
+          <a:lnRef idx="2">
+            <a:schemeClr val="accent1">
+              <a:shade val="50000"/>
+            </a:schemeClr>
+          </a:lnRef>
+          <a:fillRef idx="1">
+            <a:schemeClr val="accent1"/>
+          </a:fillRef>
+          <a:effectRef idx="0">
+            <a:schemeClr val="accent1"/>
+          </a:effectRef>
+          <a:fontRef idx="minor">
+            <a:schemeClr val="lt1"/>
+          </a:fontRef>
+        </p:style>
+        <p:txBody>
+          <a:bodyPr rtlCol="0" anchor="ctr"/>
+          <a:lstStyle/>
+          <a:p>
+            <a:pPr algn="ctr"/>
+            <a:endParaRPr lang="en-GB" sz="3600"/>
+          </a:p>
+        </p:txBody>
+      </p:sp>
+      <p:sp>
+        <p:nvSpPr>
+          <p:cNvPr id="6" name="TextBox 5">
+            <a:extLst>
+              <a:ext uri="{FF2B5EF4-FFF2-40B4-BE49-F238E27FC236}">
+                <a16:creationId xmlns:a16="http://schemas.microsoft.com/office/drawing/2014/main" id="{D84A9AD4-4D8B-46BA-A88C-3A461A39D5CC}"/>
+              </a:ext>
+            </a:extLst>
+          </p:cNvPr>
+          <p:cNvSpPr txBox="1"/>
+          <p:nvPr/>
+        </p:nvSpPr>
+        <p:spPr>
+          <a:xfrm>
+            <a:off x="90558" y="43745"/>
+            <a:ext cx="808235" cy="1200329"/>
+          </a:xfrm>
+          <a:prstGeom prst="rect">
+            <a:avLst/>
+          </a:prstGeom>
+          <a:noFill/>
+          <a:effectLst/>
+        </p:spPr>
+        <p:txBody>
+          <a:bodyPr wrap="none" rtlCol="0">
+            <a:spAutoFit/>
+          </a:bodyPr>
+          <a:lstStyle/>
+          <a:p>
+            <a:r>
+              <a:rPr lang="en-GB" sz="7200" dirty="0">
+                <a:solidFill>
+                  <a:srgbClr val="3055BB"/>
+                </a:solidFill>
+                <a:latin typeface="Poppins" panose="00000500000000000000" pitchFamily="2" charset="0"/>
+                <a:cs typeface="Poppins" panose="00000500000000000000" pitchFamily="2" charset="0"/>
+              </a:rPr>
+              <a:t>g</a:t>
+            </a:r>
+          </a:p>
+        </p:txBody>
+      </p:sp>
+    </p:spTree>
+    <p:extLst>
+      <p:ext uri="{BB962C8B-B14F-4D97-AF65-F5344CB8AC3E}">
+        <p14:creationId xmlns:p14="http://schemas.microsoft.com/office/powerpoint/2010/main" val="568506256"/>
       </p:ext>
     </p:extLst>
   </p:cSld>

</xml_diff>